<commit_message>
Choose Diet elaborated on
</commit_message>
<xml_diff>
--- a/About Calorie Counter.pptx
+++ b/About Calorie Counter.pptx
@@ -16,10 +16,11 @@
     <p:sldId id="271" r:id="rId10"/>
     <p:sldId id="272" r:id="rId11"/>
     <p:sldId id="262" r:id="rId12"/>
-    <p:sldId id="265" r:id="rId13"/>
-    <p:sldId id="266" r:id="rId14"/>
-    <p:sldId id="267" r:id="rId15"/>
-    <p:sldId id="264" r:id="rId16"/>
+    <p:sldId id="273" r:id="rId13"/>
+    <p:sldId id="274" r:id="rId14"/>
+    <p:sldId id="266" r:id="rId15"/>
+    <p:sldId id="267" r:id="rId16"/>
+    <p:sldId id="264" r:id="rId17"/>
   </p:sldIdLst>
   <p:sldSz cx="12192000" cy="6858000"/>
   <p:notesSz cx="6858000" cy="9144000"/>
@@ -28249,7 +28250,7 @@
         </p:nvSpPr>
         <p:spPr>
           <a:xfrm>
-            <a:off x="905070" y="1425484"/>
+            <a:off x="835152" y="1580994"/>
             <a:ext cx="8910734" cy="369332"/>
           </a:xfrm>
           <a:prstGeom prst="rect">
@@ -28265,7 +28266,7 @@
           <a:p>
             <a:r>
               <a:rPr lang="en-US" b="1" dirty="0"/>
-              <a:t>User is given a recommended diet and has a choice to stay with it or not.</a:t>
+              <a:t>The four diet options</a:t>
             </a:r>
           </a:p>
         </p:txBody>
@@ -28284,6 +28285,655 @@
 </file>
 
 <file path=ppt/slides/slide12.xml><?xml version="1.0" encoding="utf-8"?>
+<p:sld xmlns:a="http://schemas.openxmlformats.org/drawingml/2006/main" xmlns:r="http://schemas.openxmlformats.org/officeDocument/2006/relationships" xmlns:p="http://schemas.openxmlformats.org/presentationml/2006/main">
+  <p:cSld>
+    <p:bg>
+      <p:bgPr>
+        <a:solidFill>
+          <a:schemeClr val="bg1"/>
+        </a:solidFill>
+        <a:effectLst/>
+      </p:bgPr>
+    </p:bg>
+    <p:spTree>
+      <p:nvGrpSpPr>
+        <p:cNvPr id="1" name=""/>
+        <p:cNvGrpSpPr/>
+        <p:nvPr/>
+      </p:nvGrpSpPr>
+      <p:grpSpPr>
+        <a:xfrm>
+          <a:off x="0" y="0"/>
+          <a:ext cx="0" cy="0"/>
+          <a:chOff x="0" y="0"/>
+          <a:chExt cx="0" cy="0"/>
+        </a:xfrm>
+      </p:grpSpPr>
+      <p:sp useBgFill="1">
+        <p:nvSpPr>
+          <p:cNvPr id="38" name="Rectangle 37">
+            <a:extLst>
+              <a:ext uri="{FF2B5EF4-FFF2-40B4-BE49-F238E27FC236}">
+                <a16:creationId xmlns:a16="http://schemas.microsoft.com/office/drawing/2014/main" id="{F541DB91-0B10-46D9-B34B-7BFF9602606D}"/>
+              </a:ext>
+              <a:ext uri="{C183D7F6-B498-43B3-948B-1728B52AA6E4}">
+                <adec:decorative xmlns:adec="http://schemas.microsoft.com/office/drawing/2017/decorative" val="1"/>
+              </a:ext>
+            </a:extLst>
+          </p:cNvPr>
+          <p:cNvSpPr>
+            <a:spLocks noGrp="1" noRot="1" noChangeAspect="1" noMove="1" noResize="1" noEditPoints="1" noAdjustHandles="1" noChangeArrowheads="1" noChangeShapeType="1" noTextEdit="1"/>
+          </p:cNvSpPr>
+          <p:nvPr>
+            <p:extLst>
+              <p:ext uri="{386F3935-93C4-4BCD-93E2-E3B085C9AB24}">
+                <p16:designElem xmlns:p16="http://schemas.microsoft.com/office/powerpoint/2015/main" val="1"/>
+              </p:ext>
+            </p:extLst>
+          </p:nvPr>
+        </p:nvSpPr>
+        <p:spPr>
+          <a:xfrm>
+            <a:off x="0" y="0"/>
+            <a:ext cx="12188952" cy="6858000"/>
+          </a:xfrm>
+          <a:prstGeom prst="rect">
+            <a:avLst/>
+          </a:prstGeom>
+          <a:ln>
+            <a:noFill/>
+          </a:ln>
+        </p:spPr>
+        <p:style>
+          <a:lnRef idx="2">
+            <a:schemeClr val="accent1">
+              <a:shade val="50000"/>
+            </a:schemeClr>
+          </a:lnRef>
+          <a:fillRef idx="1">
+            <a:schemeClr val="accent1"/>
+          </a:fillRef>
+          <a:effectRef idx="0">
+            <a:schemeClr val="accent1"/>
+          </a:effectRef>
+          <a:fontRef idx="minor">
+            <a:schemeClr val="lt1"/>
+          </a:fontRef>
+        </p:style>
+        <p:txBody>
+          <a:bodyPr rtlCol="0" anchor="ctr"/>
+          <a:lstStyle/>
+          <a:p>
+            <a:pPr algn="ctr"/>
+            <a:endParaRPr lang="en-US"/>
+          </a:p>
+        </p:txBody>
+      </p:sp>
+      <p:sp>
+        <p:nvSpPr>
+          <p:cNvPr id="40" name="Freeform: Shape 39">
+            <a:extLst>
+              <a:ext uri="{FF2B5EF4-FFF2-40B4-BE49-F238E27FC236}">
+                <a16:creationId xmlns:a16="http://schemas.microsoft.com/office/drawing/2014/main" id="{9CF7FE1C-8BC5-4B0C-A2BC-93AB72C90FDD}"/>
+              </a:ext>
+              <a:ext uri="{C183D7F6-B498-43B3-948B-1728B52AA6E4}">
+                <adec:decorative xmlns:adec="http://schemas.microsoft.com/office/drawing/2017/decorative" val="1"/>
+              </a:ext>
+            </a:extLst>
+          </p:cNvPr>
+          <p:cNvSpPr>
+            <a:spLocks noGrp="1" noRot="1" noChangeAspect="1" noMove="1" noResize="1" noEditPoints="1" noAdjustHandles="1" noChangeArrowheads="1" noChangeShapeType="1" noTextEdit="1"/>
+          </p:cNvSpPr>
+          <p:nvPr>
+            <p:extLst>
+              <p:ext uri="{386F3935-93C4-4BCD-93E2-E3B085C9AB24}">
+                <p16:designElem xmlns:p16="http://schemas.microsoft.com/office/powerpoint/2015/main" val="1"/>
+              </p:ext>
+            </p:extLst>
+          </p:nvPr>
+        </p:nvSpPr>
+        <p:spPr>
+          <a:xfrm>
+            <a:off x="1768100" y="-1"/>
+            <a:ext cx="10423900" cy="5920155"/>
+          </a:xfrm>
+          <a:custGeom>
+            <a:avLst/>
+            <a:gdLst>
+              <a:gd name="connsiteX0" fmla="*/ 10423900 w 10423900"/>
+              <a:gd name="connsiteY0" fmla="*/ 0 h 5491534"/>
+              <a:gd name="connsiteX1" fmla="*/ 3493157 w 10423900"/>
+              <a:gd name="connsiteY1" fmla="*/ 0 h 5491534"/>
+              <a:gd name="connsiteX2" fmla="*/ 3493018 w 10423900"/>
+              <a:gd name="connsiteY2" fmla="*/ 31 h 5491534"/>
+              <a:gd name="connsiteX3" fmla="*/ 3245493 w 10423900"/>
+              <a:gd name="connsiteY3" fmla="*/ 104839 h 5491534"/>
+              <a:gd name="connsiteX4" fmla="*/ 4434802 w 10423900"/>
+              <a:gd name="connsiteY4" fmla="*/ 284558 h 5491534"/>
+              <a:gd name="connsiteX5" fmla="*/ 4011937 w 10423900"/>
+              <a:gd name="connsiteY5" fmla="*/ 395559 h 5491534"/>
+              <a:gd name="connsiteX6" fmla="*/ 3573213 w 10423900"/>
+              <a:gd name="connsiteY6" fmla="*/ 474847 h 5491534"/>
+              <a:gd name="connsiteX7" fmla="*/ 3097489 w 10423900"/>
+              <a:gd name="connsiteY7" fmla="*/ 532990 h 5491534"/>
+              <a:gd name="connsiteX8" fmla="*/ 2664052 w 10423900"/>
+              <a:gd name="connsiteY8" fmla="*/ 649279 h 5491534"/>
+              <a:gd name="connsiteX9" fmla="*/ 3795218 w 10423900"/>
+              <a:gd name="connsiteY9" fmla="*/ 696852 h 5491534"/>
+              <a:gd name="connsiteX10" fmla="*/ 3208492 w 10423900"/>
+              <a:gd name="connsiteY10" fmla="*/ 802568 h 5491534"/>
+              <a:gd name="connsiteX11" fmla="*/ 2727483 w 10423900"/>
+              <a:gd name="connsiteY11" fmla="*/ 939999 h 5491534"/>
+              <a:gd name="connsiteX12" fmla="*/ 2389190 w 10423900"/>
+              <a:gd name="connsiteY12" fmla="*/ 1003429 h 5491534"/>
+              <a:gd name="connsiteX13" fmla="*/ 2029754 w 10423900"/>
+              <a:gd name="connsiteY13" fmla="*/ 1019287 h 5491534"/>
+              <a:gd name="connsiteX14" fmla="*/ 1945181 w 10423900"/>
+              <a:gd name="connsiteY14" fmla="*/ 1119716 h 5491534"/>
+              <a:gd name="connsiteX15" fmla="*/ 2056184 w 10423900"/>
+              <a:gd name="connsiteY15" fmla="*/ 1225434 h 5491534"/>
+              <a:gd name="connsiteX16" fmla="*/ 2225329 w 10423900"/>
+              <a:gd name="connsiteY16" fmla="*/ 1236004 h 5491534"/>
+              <a:gd name="connsiteX17" fmla="*/ 3234920 w 10423900"/>
+              <a:gd name="connsiteY17" fmla="*/ 1262435 h 5491534"/>
+              <a:gd name="connsiteX18" fmla="*/ 0 w 10423900"/>
+              <a:gd name="connsiteY18" fmla="*/ 1495009 h 5491534"/>
+              <a:gd name="connsiteX19" fmla="*/ 438724 w 10423900"/>
+              <a:gd name="connsiteY19" fmla="*/ 1637728 h 5491534"/>
+              <a:gd name="connsiteX20" fmla="*/ 586726 w 10423900"/>
+              <a:gd name="connsiteY20" fmla="*/ 2028877 h 5491534"/>
+              <a:gd name="connsiteX21" fmla="*/ 1125878 w 10423900"/>
+              <a:gd name="connsiteY21" fmla="*/ 2250882 h 5491534"/>
+              <a:gd name="connsiteX22" fmla="*/ 1474744 w 10423900"/>
+              <a:gd name="connsiteY22" fmla="*/ 2330169 h 5491534"/>
+              <a:gd name="connsiteX23" fmla="*/ 2272901 w 10423900"/>
+              <a:gd name="connsiteY23" fmla="*/ 2446458 h 5491534"/>
+              <a:gd name="connsiteX24" fmla="*/ 2389190 w 10423900"/>
+              <a:gd name="connsiteY24" fmla="*/ 2636747 h 5491534"/>
+              <a:gd name="connsiteX25" fmla="*/ 2489621 w 10423900"/>
+              <a:gd name="connsiteY25" fmla="*/ 2848179 h 5491534"/>
+              <a:gd name="connsiteX26" fmla="*/ 2701053 w 10423900"/>
+              <a:gd name="connsiteY26" fmla="*/ 2985611 h 5491534"/>
+              <a:gd name="connsiteX27" fmla="*/ 1057165 w 10423900"/>
+              <a:gd name="connsiteY27" fmla="*/ 2964468 h 5491534"/>
+              <a:gd name="connsiteX28" fmla="*/ 2912485 w 10423900"/>
+              <a:gd name="connsiteY28" fmla="*/ 3408477 h 5491534"/>
+              <a:gd name="connsiteX29" fmla="*/ 2748626 w 10423900"/>
+              <a:gd name="connsiteY29" fmla="*/ 3582909 h 5491534"/>
+              <a:gd name="connsiteX30" fmla="*/ 3763503 w 10423900"/>
+              <a:gd name="connsiteY30" fmla="*/ 3820771 h 5491534"/>
+              <a:gd name="connsiteX31" fmla="*/ 3219063 w 10423900"/>
+              <a:gd name="connsiteY31" fmla="*/ 3847199 h 5491534"/>
+              <a:gd name="connsiteX32" fmla="*/ 6385269 w 10423900"/>
+              <a:gd name="connsiteY32" fmla="*/ 4840933 h 5491534"/>
+              <a:gd name="connsiteX33" fmla="*/ 10285854 w 10423900"/>
+              <a:gd name="connsiteY33" fmla="*/ 5471118 h 5491534"/>
+              <a:gd name="connsiteX34" fmla="*/ 10423900 w 10423900"/>
+              <a:gd name="connsiteY34" fmla="*/ 5491534 h 5491534"/>
+            </a:gdLst>
+            <a:ahLst/>
+            <a:cxnLst>
+              <a:cxn ang="0">
+                <a:pos x="connsiteX0" y="connsiteY0"/>
+              </a:cxn>
+              <a:cxn ang="0">
+                <a:pos x="connsiteX1" y="connsiteY1"/>
+              </a:cxn>
+              <a:cxn ang="0">
+                <a:pos x="connsiteX2" y="connsiteY2"/>
+              </a:cxn>
+              <a:cxn ang="0">
+                <a:pos x="connsiteX3" y="connsiteY3"/>
+              </a:cxn>
+              <a:cxn ang="0">
+                <a:pos x="connsiteX4" y="connsiteY4"/>
+              </a:cxn>
+              <a:cxn ang="0">
+                <a:pos x="connsiteX5" y="connsiteY5"/>
+              </a:cxn>
+              <a:cxn ang="0">
+                <a:pos x="connsiteX6" y="connsiteY6"/>
+              </a:cxn>
+              <a:cxn ang="0">
+                <a:pos x="connsiteX7" y="connsiteY7"/>
+              </a:cxn>
+              <a:cxn ang="0">
+                <a:pos x="connsiteX8" y="connsiteY8"/>
+              </a:cxn>
+              <a:cxn ang="0">
+                <a:pos x="connsiteX9" y="connsiteY9"/>
+              </a:cxn>
+              <a:cxn ang="0">
+                <a:pos x="connsiteX10" y="connsiteY10"/>
+              </a:cxn>
+              <a:cxn ang="0">
+                <a:pos x="connsiteX11" y="connsiteY11"/>
+              </a:cxn>
+              <a:cxn ang="0">
+                <a:pos x="connsiteX12" y="connsiteY12"/>
+              </a:cxn>
+              <a:cxn ang="0">
+                <a:pos x="connsiteX13" y="connsiteY13"/>
+              </a:cxn>
+              <a:cxn ang="0">
+                <a:pos x="connsiteX14" y="connsiteY14"/>
+              </a:cxn>
+              <a:cxn ang="0">
+                <a:pos x="connsiteX15" y="connsiteY15"/>
+              </a:cxn>
+              <a:cxn ang="0">
+                <a:pos x="connsiteX16" y="connsiteY16"/>
+              </a:cxn>
+              <a:cxn ang="0">
+                <a:pos x="connsiteX17" y="connsiteY17"/>
+              </a:cxn>
+              <a:cxn ang="0">
+                <a:pos x="connsiteX18" y="connsiteY18"/>
+              </a:cxn>
+              <a:cxn ang="0">
+                <a:pos x="connsiteX19" y="connsiteY19"/>
+              </a:cxn>
+              <a:cxn ang="0">
+                <a:pos x="connsiteX20" y="connsiteY20"/>
+              </a:cxn>
+              <a:cxn ang="0">
+                <a:pos x="connsiteX21" y="connsiteY21"/>
+              </a:cxn>
+              <a:cxn ang="0">
+                <a:pos x="connsiteX22" y="connsiteY22"/>
+              </a:cxn>
+              <a:cxn ang="0">
+                <a:pos x="connsiteX23" y="connsiteY23"/>
+              </a:cxn>
+              <a:cxn ang="0">
+                <a:pos x="connsiteX24" y="connsiteY24"/>
+              </a:cxn>
+              <a:cxn ang="0">
+                <a:pos x="connsiteX25" y="connsiteY25"/>
+              </a:cxn>
+              <a:cxn ang="0">
+                <a:pos x="connsiteX26" y="connsiteY26"/>
+              </a:cxn>
+              <a:cxn ang="0">
+                <a:pos x="connsiteX27" y="connsiteY27"/>
+              </a:cxn>
+              <a:cxn ang="0">
+                <a:pos x="connsiteX28" y="connsiteY28"/>
+              </a:cxn>
+              <a:cxn ang="0">
+                <a:pos x="connsiteX29" y="connsiteY29"/>
+              </a:cxn>
+              <a:cxn ang="0">
+                <a:pos x="connsiteX30" y="connsiteY30"/>
+              </a:cxn>
+              <a:cxn ang="0">
+                <a:pos x="connsiteX31" y="connsiteY31"/>
+              </a:cxn>
+              <a:cxn ang="0">
+                <a:pos x="connsiteX32" y="connsiteY32"/>
+              </a:cxn>
+              <a:cxn ang="0">
+                <a:pos x="connsiteX33" y="connsiteY33"/>
+              </a:cxn>
+              <a:cxn ang="0">
+                <a:pos x="connsiteX34" y="connsiteY34"/>
+              </a:cxn>
+            </a:cxnLst>
+            <a:rect l="l" t="t" r="r" b="b"/>
+            <a:pathLst>
+              <a:path w="10423900" h="5491534">
+                <a:moveTo>
+                  <a:pt x="10423900" y="0"/>
+                </a:moveTo>
+                <a:lnTo>
+                  <a:pt x="3493157" y="0"/>
+                </a:lnTo>
+                <a:lnTo>
+                  <a:pt x="3493018" y="31"/>
+                </a:lnTo>
+                <a:cubicBezTo>
+                  <a:pt x="3414969" y="12668"/>
+                  <a:pt x="3328744" y="21588"/>
+                  <a:pt x="3245493" y="104839"/>
+                </a:cubicBezTo>
+                <a:cubicBezTo>
+                  <a:pt x="3668357" y="162984"/>
+                  <a:pt x="4075366" y="51981"/>
+                  <a:pt x="4434802" y="284558"/>
+                </a:cubicBezTo>
+                <a:cubicBezTo>
+                  <a:pt x="4302656" y="400846"/>
+                  <a:pt x="4154654" y="374416"/>
+                  <a:pt x="4011937" y="395559"/>
+                </a:cubicBezTo>
+                <a:cubicBezTo>
+                  <a:pt x="3863934" y="416704"/>
+                  <a:pt x="3721217" y="453704"/>
+                  <a:pt x="3573213" y="474847"/>
+                </a:cubicBezTo>
+                <a:cubicBezTo>
+                  <a:pt x="3414639" y="501275"/>
+                  <a:pt x="3256063" y="506562"/>
+                  <a:pt x="3097489" y="532990"/>
+                </a:cubicBezTo>
+                <a:cubicBezTo>
+                  <a:pt x="2965345" y="554135"/>
+                  <a:pt x="2822627" y="517133"/>
+                  <a:pt x="2664052" y="649279"/>
+                </a:cubicBezTo>
+                <a:cubicBezTo>
+                  <a:pt x="3055203" y="744424"/>
+                  <a:pt x="3409352" y="601706"/>
+                  <a:pt x="3795218" y="696852"/>
+                </a:cubicBezTo>
+                <a:cubicBezTo>
+                  <a:pt x="3567928" y="781425"/>
+                  <a:pt x="3382924" y="754995"/>
+                  <a:pt x="3208492" y="802568"/>
+                </a:cubicBezTo>
+                <a:cubicBezTo>
+                  <a:pt x="3049916" y="850140"/>
+                  <a:pt x="2859627" y="797282"/>
+                  <a:pt x="2727483" y="939999"/>
+                </a:cubicBezTo>
+                <a:cubicBezTo>
+                  <a:pt x="2627052" y="1051000"/>
+                  <a:pt x="2521336" y="1066858"/>
+                  <a:pt x="2389190" y="1003429"/>
+                </a:cubicBezTo>
+                <a:cubicBezTo>
+                  <a:pt x="2272901" y="945284"/>
+                  <a:pt x="2146043" y="961142"/>
+                  <a:pt x="2029754" y="1019287"/>
+                </a:cubicBezTo>
+                <a:cubicBezTo>
+                  <a:pt x="1987468" y="1040430"/>
+                  <a:pt x="1945181" y="1066858"/>
+                  <a:pt x="1945181" y="1119716"/>
+                </a:cubicBezTo>
+                <a:cubicBezTo>
+                  <a:pt x="1945181" y="1193719"/>
+                  <a:pt x="1998039" y="1214862"/>
+                  <a:pt x="2056184" y="1225434"/>
+                </a:cubicBezTo>
+                <a:cubicBezTo>
+                  <a:pt x="2109042" y="1236004"/>
+                  <a:pt x="2172471" y="1246577"/>
+                  <a:pt x="2225329" y="1236004"/>
+                </a:cubicBezTo>
+                <a:cubicBezTo>
+                  <a:pt x="2563622" y="1177861"/>
+                  <a:pt x="2896629" y="1273005"/>
+                  <a:pt x="3234920" y="1262435"/>
+                </a:cubicBezTo>
+                <a:cubicBezTo>
+                  <a:pt x="2172471" y="1489724"/>
+                  <a:pt x="1099450" y="1415723"/>
+                  <a:pt x="0" y="1495009"/>
+                </a:cubicBezTo>
+                <a:cubicBezTo>
+                  <a:pt x="142717" y="1653583"/>
+                  <a:pt x="327721" y="1521439"/>
+                  <a:pt x="438724" y="1637728"/>
+                </a:cubicBezTo>
+                <a:cubicBezTo>
+                  <a:pt x="333006" y="1880875"/>
+                  <a:pt x="375293" y="2013020"/>
+                  <a:pt x="586726" y="2028877"/>
+                </a:cubicBezTo>
+                <a:cubicBezTo>
+                  <a:pt x="792873" y="2044734"/>
+                  <a:pt x="1014877" y="1960161"/>
+                  <a:pt x="1125878" y="2250882"/>
+                </a:cubicBezTo>
+                <a:cubicBezTo>
+                  <a:pt x="1157593" y="2340740"/>
+                  <a:pt x="1353170" y="2314312"/>
+                  <a:pt x="1474744" y="2330169"/>
+                </a:cubicBezTo>
+                <a:cubicBezTo>
+                  <a:pt x="1739034" y="2367170"/>
+                  <a:pt x="2019183" y="2330169"/>
+                  <a:pt x="2272901" y="2446458"/>
+                </a:cubicBezTo>
+                <a:cubicBezTo>
+                  <a:pt x="2373332" y="2488744"/>
+                  <a:pt x="2442048" y="2520459"/>
+                  <a:pt x="2389190" y="2636747"/>
+                </a:cubicBezTo>
+                <a:cubicBezTo>
+                  <a:pt x="2336332" y="2758321"/>
+                  <a:pt x="2405048" y="2800607"/>
+                  <a:pt x="2489621" y="2848179"/>
+                </a:cubicBezTo>
+                <a:cubicBezTo>
+                  <a:pt x="2553051" y="2885180"/>
+                  <a:pt x="2648195" y="2874609"/>
+                  <a:pt x="2701053" y="2985611"/>
+                </a:cubicBezTo>
+                <a:cubicBezTo>
+                  <a:pt x="2146043" y="2969753"/>
+                  <a:pt x="1606888" y="2879895"/>
+                  <a:pt x="1057165" y="2964468"/>
+                </a:cubicBezTo>
+                <a:cubicBezTo>
+                  <a:pt x="1659748" y="3175900"/>
+                  <a:pt x="2320474" y="3165328"/>
+                  <a:pt x="2912485" y="3408477"/>
+                </a:cubicBezTo>
+                <a:cubicBezTo>
+                  <a:pt x="2891342" y="3493050"/>
+                  <a:pt x="2753911" y="3456048"/>
+                  <a:pt x="2748626" y="3582909"/>
+                </a:cubicBezTo>
+                <a:cubicBezTo>
+                  <a:pt x="3060489" y="3715055"/>
+                  <a:pt x="3435782" y="3625195"/>
+                  <a:pt x="3763503" y="3820771"/>
+                </a:cubicBezTo>
+                <a:cubicBezTo>
+                  <a:pt x="3573213" y="3910629"/>
+                  <a:pt x="3398782" y="3762626"/>
+                  <a:pt x="3219063" y="3847199"/>
+                </a:cubicBezTo>
+                <a:cubicBezTo>
+                  <a:pt x="3277208" y="3974060"/>
+                  <a:pt x="5909545" y="4756360"/>
+                  <a:pt x="6385269" y="4840933"/>
+                </a:cubicBezTo>
+                <a:cubicBezTo>
+                  <a:pt x="7171204" y="4982659"/>
+                  <a:pt x="9157515" y="5302348"/>
+                  <a:pt x="10285854" y="5471118"/>
+                </a:cubicBezTo>
+                <a:lnTo>
+                  <a:pt x="10423900" y="5491534"/>
+                </a:lnTo>
+                <a:close/>
+              </a:path>
+            </a:pathLst>
+          </a:custGeom>
+          <a:solidFill>
+            <a:srgbClr val="C3914D">
+              <a:alpha val="20000"/>
+            </a:srgbClr>
+          </a:solidFill>
+          <a:ln w="32707" cap="flat">
+            <a:noFill/>
+            <a:prstDash val="solid"/>
+            <a:miter/>
+          </a:ln>
+        </p:spPr>
+        <p:txBody>
+          <a:bodyPr wrap="square" rtlCol="0" anchor="ctr">
+            <a:noAutofit/>
+          </a:bodyPr>
+          <a:lstStyle/>
+          <a:p>
+            <a:endParaRPr lang="en-US"/>
+          </a:p>
+        </p:txBody>
+      </p:sp>
+      <p:sp>
+        <p:nvSpPr>
+          <p:cNvPr id="2" name="Title 1">
+            <a:extLst>
+              <a:ext uri="{FF2B5EF4-FFF2-40B4-BE49-F238E27FC236}">
+                <a16:creationId xmlns:a16="http://schemas.microsoft.com/office/drawing/2014/main" id="{13E2C10B-B7B8-458E-9899-91681D7C4492}"/>
+              </a:ext>
+            </a:extLst>
+          </p:cNvPr>
+          <p:cNvSpPr>
+            <a:spLocks noGrp="1"/>
+          </p:cNvSpPr>
+          <p:nvPr>
+            <p:ph type="title"/>
+          </p:nvPr>
+        </p:nvSpPr>
+        <p:spPr>
+          <a:xfrm>
+            <a:off x="5526156" y="365125"/>
+            <a:ext cx="5827643" cy="1433433"/>
+          </a:xfrm>
+        </p:spPr>
+        <p:txBody>
+          <a:bodyPr vert="horz" lIns="91440" tIns="45720" rIns="91440" bIns="45720" rtlCol="0" anchor="b">
+            <a:normAutofit/>
+          </a:bodyPr>
+          <a:lstStyle/>
+          <a:p>
+            <a:pPr marL="0" indent="0"/>
+            <a:r>
+              <a:rPr lang="en-US"/>
+              <a:t>Choose a Diet Plan</a:t>
+            </a:r>
+            <a:br>
+              <a:rPr lang="en-US"/>
+            </a:br>
+            <a:endParaRPr lang="en-US"/>
+          </a:p>
+        </p:txBody>
+      </p:sp>
+      <p:pic>
+        <p:nvPicPr>
+          <p:cNvPr id="23" name="Graphic 22" descr="Fork and knife">
+            <a:extLst>
+              <a:ext uri="{FF2B5EF4-FFF2-40B4-BE49-F238E27FC236}">
+                <a16:creationId xmlns:a16="http://schemas.microsoft.com/office/drawing/2014/main" id="{86CE5BBD-7BC1-4DED-80D3-6E17BD697F3D}"/>
+              </a:ext>
+            </a:extLst>
+          </p:cNvPr>
+          <p:cNvPicPr>
+            <a:picLocks noChangeAspect="1"/>
+          </p:cNvPicPr>
+          <p:nvPr/>
+        </p:nvPicPr>
+        <p:blipFill>
+          <a:blip r:embed="rId2">
+            <a:extLst>
+              <a:ext uri="{28A0092B-C50C-407E-A947-70E740481C1C}">
+                <a14:useLocalDpi xmlns:a14="http://schemas.microsoft.com/office/drawing/2010/main" val="0"/>
+              </a:ext>
+              <a:ext uri="{96DAC541-7B7A-43D3-8B79-37D633B846F1}">
+                <asvg:svgBlip xmlns:asvg="http://schemas.microsoft.com/office/drawing/2016/SVG/main" r:embed="rId3"/>
+              </a:ext>
+            </a:extLst>
+          </a:blip>
+          <a:stretch>
+            <a:fillRect/>
+          </a:stretch>
+        </p:blipFill>
+        <p:spPr>
+          <a:xfrm>
+            <a:off x="1073717" y="2782956"/>
+            <a:ext cx="3449030" cy="3449030"/>
+          </a:xfrm>
+          <a:prstGeom prst="rect">
+            <a:avLst/>
+          </a:prstGeom>
+        </p:spPr>
+      </p:pic>
+      <p:sp>
+        <p:nvSpPr>
+          <p:cNvPr id="37" name="TextBox 14">
+            <a:extLst>
+              <a:ext uri="{FF2B5EF4-FFF2-40B4-BE49-F238E27FC236}">
+                <a16:creationId xmlns:a16="http://schemas.microsoft.com/office/drawing/2014/main" id="{CF440FBE-2E30-4B9A-BA67-6A6D03654923}"/>
+              </a:ext>
+            </a:extLst>
+          </p:cNvPr>
+          <p:cNvSpPr txBox="1"/>
+          <p:nvPr/>
+        </p:nvSpPr>
+        <p:spPr>
+          <a:xfrm>
+            <a:off x="5526156" y="2055813"/>
+            <a:ext cx="5827644" cy="4121149"/>
+          </a:xfrm>
+          <a:prstGeom prst="rect">
+            <a:avLst/>
+          </a:prstGeom>
+        </p:spPr>
+        <p:txBody>
+          <a:bodyPr vert="horz" lIns="91440" tIns="45720" rIns="91440" bIns="45720" rtlCol="0" anchor="t">
+            <a:normAutofit/>
+          </a:bodyPr>
+          <a:lstStyle/>
+          <a:p>
+            <a:pPr indent="-228600">
+              <a:spcAft>
+                <a:spcPts val="600"/>
+              </a:spcAft>
+              <a:buFont typeface="Arial" panose="020B0604020202020204" pitchFamily="34" charset="0"/>
+              <a:buChar char="•"/>
+            </a:pPr>
+            <a:r>
+              <a:rPr lang="en-US" sz="2400" b="1"/>
+              <a:t>Based on the user’s profile, we tell him which diet we recommend and how many daily calories it allows.</a:t>
+            </a:r>
+          </a:p>
+          <a:p>
+            <a:pPr indent="-228600">
+              <a:spcAft>
+                <a:spcPts val="600"/>
+              </a:spcAft>
+              <a:buFont typeface="Arial" panose="020B0604020202020204" pitchFamily="34" charset="0"/>
+              <a:buChar char="•"/>
+            </a:pPr>
+            <a:r>
+              <a:rPr lang="en-US" sz="2400" b="1"/>
+              <a:t>The user, however can choose to go ahead with any of the other diet options.</a:t>
+            </a:r>
+          </a:p>
+          <a:p>
+            <a:pPr indent="-228600">
+              <a:spcAft>
+                <a:spcPts val="600"/>
+              </a:spcAft>
+              <a:buFont typeface="Arial" panose="020B0604020202020204" pitchFamily="34" charset="0"/>
+              <a:buChar char="•"/>
+            </a:pPr>
+            <a:r>
+              <a:rPr lang="en-US" sz="2400" b="1"/>
+              <a:t>Once the user chooses, we set his daily calorie goal</a:t>
+            </a:r>
+          </a:p>
+        </p:txBody>
+      </p:sp>
+    </p:spTree>
+    <p:extLst>
+      <p:ext uri="{BB962C8B-B14F-4D97-AF65-F5344CB8AC3E}">
+        <p14:creationId xmlns:p14="http://schemas.microsoft.com/office/powerpoint/2010/main" val="3536759304"/>
+      </p:ext>
+    </p:extLst>
+  </p:cSld>
+  <p:clrMapOvr>
+    <a:masterClrMapping/>
+  </p:clrMapOvr>
+</p:sld>
+</file>
+
+<file path=ppt/slides/slide13.xml><?xml version="1.0" encoding="utf-8"?>
 <p:sld xmlns:a="http://schemas.openxmlformats.org/drawingml/2006/main" xmlns:r="http://schemas.openxmlformats.org/officeDocument/2006/relationships" xmlns:p="http://schemas.openxmlformats.org/presentationml/2006/main">
   <p:cSld>
     <p:bg>
@@ -30514,13 +31164,13 @@
         </p:nvSpPr>
         <p:spPr>
           <a:xfrm>
-            <a:off x="232920" y="151042"/>
-            <a:ext cx="7166255" cy="2071395"/>
+            <a:off x="3767113" y="702128"/>
+            <a:ext cx="7294783" cy="2071395"/>
           </a:xfrm>
         </p:spPr>
         <p:txBody>
           <a:bodyPr vert="horz" lIns="91440" tIns="45720" rIns="91440" bIns="45720" rtlCol="0" anchor="b">
-            <a:normAutofit/>
+            <a:normAutofit fontScale="90000"/>
           </a:bodyPr>
           <a:lstStyle/>
           <a:p>
@@ -30532,18 +31182,305 @@
               <a:t>Track Calorie Intake</a:t>
             </a:r>
             <a:br>
+              <a:rPr lang="en-US" sz="4800" dirty="0"/>
+            </a:br>
+            <a:r>
+              <a:rPr lang="en-US" sz="3100" dirty="0"/>
+              <a:t>Now the user can start tracking his calorie intake</a:t>
+            </a:r>
+            <a:br>
               <a:rPr lang="en-US" sz="3600" dirty="0"/>
             </a:br>
             <a:endParaRPr lang="en-US" sz="4800" dirty="0"/>
           </a:p>
         </p:txBody>
       </p:sp>
+      <p:grpSp>
+        <p:nvGrpSpPr>
+          <p:cNvPr id="13" name="Group 12">
+            <a:extLst>
+              <a:ext uri="{FF2B5EF4-FFF2-40B4-BE49-F238E27FC236}">
+                <a16:creationId xmlns:a16="http://schemas.microsoft.com/office/drawing/2014/main" id="{25499E38-BDB5-48DF-9B14-29C4D8A755FB}"/>
+              </a:ext>
+            </a:extLst>
+          </p:cNvPr>
+          <p:cNvGrpSpPr/>
+          <p:nvPr/>
+        </p:nvGrpSpPr>
+        <p:grpSpPr>
+          <a:xfrm>
+            <a:off x="512989" y="170715"/>
+            <a:ext cx="2444055" cy="3421677"/>
+            <a:chOff x="5380002" y="369579"/>
+            <a:chExt cx="2444055" cy="3421677"/>
+          </a:xfrm>
+        </p:grpSpPr>
+        <p:sp>
+          <p:nvSpPr>
+            <p:cNvPr id="25" name="Rectangle 24">
+              <a:extLst>
+                <a:ext uri="{FF2B5EF4-FFF2-40B4-BE49-F238E27FC236}">
+                  <a16:creationId xmlns:a16="http://schemas.microsoft.com/office/drawing/2014/main" id="{7EB654B1-B060-4DFB-B51E-BC9BF6F670D2}"/>
+                </a:ext>
+              </a:extLst>
+            </p:cNvPr>
+            <p:cNvSpPr/>
+            <p:nvPr/>
+          </p:nvSpPr>
+          <p:spPr>
+            <a:xfrm>
+              <a:off x="5380002" y="369579"/>
+              <a:ext cx="2444055" cy="3421677"/>
+            </a:xfrm>
+            <a:prstGeom prst="rect">
+              <a:avLst/>
+            </a:prstGeom>
+          </p:spPr>
+          <p:style>
+            <a:lnRef idx="2">
+              <a:schemeClr val="accent2">
+                <a:tint val="40000"/>
+                <a:alpha val="90000"/>
+                <a:hueOff val="1285837"/>
+                <a:satOff val="1632"/>
+                <a:lumOff val="440"/>
+                <a:alphaOff val="0"/>
+              </a:schemeClr>
+            </a:lnRef>
+            <a:fillRef idx="1">
+              <a:schemeClr val="accent2">
+                <a:tint val="40000"/>
+                <a:alpha val="90000"/>
+                <a:hueOff val="1285837"/>
+                <a:satOff val="1632"/>
+                <a:lumOff val="440"/>
+                <a:alphaOff val="0"/>
+              </a:schemeClr>
+            </a:fillRef>
+            <a:effectRef idx="0">
+              <a:schemeClr val="accent2">
+                <a:tint val="40000"/>
+                <a:alpha val="90000"/>
+                <a:hueOff val="1285837"/>
+                <a:satOff val="1632"/>
+                <a:lumOff val="440"/>
+                <a:alphaOff val="0"/>
+              </a:schemeClr>
+            </a:effectRef>
+            <a:fontRef idx="minor">
+              <a:schemeClr val="dk1">
+                <a:hueOff val="0"/>
+                <a:satOff val="0"/>
+                <a:lumOff val="0"/>
+                <a:alphaOff val="0"/>
+              </a:schemeClr>
+            </a:fontRef>
+          </p:style>
+        </p:sp>
+        <p:sp>
+          <p:nvSpPr>
+            <p:cNvPr id="26" name="TextBox 25">
+              <a:extLst>
+                <a:ext uri="{FF2B5EF4-FFF2-40B4-BE49-F238E27FC236}">
+                  <a16:creationId xmlns:a16="http://schemas.microsoft.com/office/drawing/2014/main" id="{050A1696-F4E7-4A3F-832B-851C274E5FA2}"/>
+                </a:ext>
+              </a:extLst>
+            </p:cNvPr>
+            <p:cNvSpPr txBox="1"/>
+            <p:nvPr/>
+          </p:nvSpPr>
+          <p:spPr>
+            <a:xfrm>
+              <a:off x="5380002" y="1669817"/>
+              <a:ext cx="2444055" cy="2053006"/>
+            </a:xfrm>
+            <a:prstGeom prst="rect">
+              <a:avLst/>
+            </a:prstGeom>
+          </p:spPr>
+          <p:style>
+            <a:lnRef idx="0">
+              <a:scrgbClr r="0" g="0" b="0"/>
+            </a:lnRef>
+            <a:fillRef idx="0">
+              <a:scrgbClr r="0" g="0" b="0"/>
+            </a:fillRef>
+            <a:effectRef idx="0">
+              <a:scrgbClr r="0" g="0" b="0"/>
+            </a:effectRef>
+            <a:fontRef idx="minor">
+              <a:schemeClr val="dk1">
+                <a:hueOff val="0"/>
+                <a:satOff val="0"/>
+                <a:lumOff val="0"/>
+                <a:alphaOff val="0"/>
+              </a:schemeClr>
+            </a:fontRef>
+          </p:style>
+          <p:txBody>
+            <a:bodyPr spcFirstLastPara="0" vert="horz" wrap="square" lIns="190548" tIns="330200" rIns="190548" bIns="330200" numCol="1" spcCol="1270" anchor="t" anchorCtr="0">
+              <a:noAutofit/>
+            </a:bodyPr>
+            <a:lstStyle/>
+            <a:p>
+              <a:pPr marL="0" lvl="0" indent="0" algn="ctr" defTabSz="1155700">
+                <a:lnSpc>
+                  <a:spcPct val="90000"/>
+                </a:lnSpc>
+                <a:spcBef>
+                  <a:spcPct val="0"/>
+                </a:spcBef>
+                <a:spcAft>
+                  <a:spcPct val="35000"/>
+                </a:spcAft>
+                <a:buNone/>
+              </a:pPr>
+              <a:r>
+                <a:rPr lang="en-US" sz="2600" kern="1200" dirty="0"/>
+                <a:t>Track calorie intake</a:t>
+              </a:r>
+            </a:p>
+          </p:txBody>
+        </p:sp>
+      </p:grpSp>
+      <p:grpSp>
+        <p:nvGrpSpPr>
+          <p:cNvPr id="15" name="Group 14">
+            <a:extLst>
+              <a:ext uri="{FF2B5EF4-FFF2-40B4-BE49-F238E27FC236}">
+                <a16:creationId xmlns:a16="http://schemas.microsoft.com/office/drawing/2014/main" id="{40944574-B633-4E2E-B6C7-0F4D783D562A}"/>
+              </a:ext>
+            </a:extLst>
+          </p:cNvPr>
+          <p:cNvGrpSpPr/>
+          <p:nvPr/>
+        </p:nvGrpSpPr>
+        <p:grpSpPr>
+          <a:xfrm>
+            <a:off x="1221765" y="512883"/>
+            <a:ext cx="1026503" cy="1026503"/>
+            <a:chOff x="6088778" y="711747"/>
+            <a:chExt cx="1026503" cy="1026503"/>
+          </a:xfrm>
+        </p:grpSpPr>
+        <p:sp>
+          <p:nvSpPr>
+            <p:cNvPr id="16" name="Oval 15">
+              <a:extLst>
+                <a:ext uri="{FF2B5EF4-FFF2-40B4-BE49-F238E27FC236}">
+                  <a16:creationId xmlns:a16="http://schemas.microsoft.com/office/drawing/2014/main" id="{8A16519F-6E81-4EDD-ACD4-599631597338}"/>
+                </a:ext>
+              </a:extLst>
+            </p:cNvPr>
+            <p:cNvSpPr/>
+            <p:nvPr/>
+          </p:nvSpPr>
+          <p:spPr>
+            <a:xfrm>
+              <a:off x="6088778" y="711747"/>
+              <a:ext cx="1026503" cy="1026503"/>
+            </a:xfrm>
+            <a:prstGeom prst="ellipse">
+              <a:avLst/>
+            </a:prstGeom>
+          </p:spPr>
+          <p:style>
+            <a:lnRef idx="2">
+              <a:schemeClr val="accent2">
+                <a:hueOff val="853061"/>
+                <a:satOff val="-3674"/>
+                <a:lumOff val="2354"/>
+                <a:alphaOff val="0"/>
+              </a:schemeClr>
+            </a:lnRef>
+            <a:fillRef idx="1">
+              <a:schemeClr val="accent2">
+                <a:hueOff val="853061"/>
+                <a:satOff val="-3674"/>
+                <a:lumOff val="2354"/>
+                <a:alphaOff val="0"/>
+              </a:schemeClr>
+            </a:fillRef>
+            <a:effectRef idx="0">
+              <a:schemeClr val="accent2">
+                <a:hueOff val="853061"/>
+                <a:satOff val="-3674"/>
+                <a:lumOff val="2354"/>
+                <a:alphaOff val="0"/>
+              </a:schemeClr>
+            </a:effectRef>
+            <a:fontRef idx="minor">
+              <a:schemeClr val="lt1"/>
+            </a:fontRef>
+          </p:style>
+        </p:sp>
+        <p:sp>
+          <p:nvSpPr>
+            <p:cNvPr id="24" name="Oval 6">
+              <a:extLst>
+                <a:ext uri="{FF2B5EF4-FFF2-40B4-BE49-F238E27FC236}">
+                  <a16:creationId xmlns:a16="http://schemas.microsoft.com/office/drawing/2014/main" id="{30C5D31D-B138-46C8-BE12-55E12F28AB59}"/>
+                </a:ext>
+              </a:extLst>
+            </p:cNvPr>
+            <p:cNvSpPr txBox="1"/>
+            <p:nvPr/>
+          </p:nvSpPr>
+          <p:spPr>
+            <a:xfrm>
+              <a:off x="6239106" y="862075"/>
+              <a:ext cx="725847" cy="725847"/>
+            </a:xfrm>
+            <a:prstGeom prst="rect">
+              <a:avLst/>
+            </a:prstGeom>
+          </p:spPr>
+          <p:style>
+            <a:lnRef idx="0">
+              <a:scrgbClr r="0" g="0" b="0"/>
+            </a:lnRef>
+            <a:fillRef idx="0">
+              <a:scrgbClr r="0" g="0" b="0"/>
+            </a:fillRef>
+            <a:effectRef idx="0">
+              <a:scrgbClr r="0" g="0" b="0"/>
+            </a:effectRef>
+            <a:fontRef idx="minor">
+              <a:schemeClr val="lt1"/>
+            </a:fontRef>
+          </p:style>
+          <p:txBody>
+            <a:bodyPr spcFirstLastPara="0" vert="horz" wrap="square" lIns="80030" tIns="12700" rIns="80030" bIns="12700" numCol="1" spcCol="1270" anchor="ctr" anchorCtr="0">
+              <a:noAutofit/>
+            </a:bodyPr>
+            <a:lstStyle/>
+            <a:p>
+              <a:pPr marL="0" lvl="0" indent="0" algn="ctr" defTabSz="2133600">
+                <a:lnSpc>
+                  <a:spcPct val="90000"/>
+                </a:lnSpc>
+                <a:spcBef>
+                  <a:spcPct val="0"/>
+                </a:spcBef>
+                <a:spcAft>
+                  <a:spcPct val="35000"/>
+                </a:spcAft>
+                <a:buNone/>
+              </a:pPr>
+              <a:r>
+                <a:rPr lang="en-US" sz="4800" kern="1200"/>
+                <a:t>3</a:t>
+              </a:r>
+            </a:p>
+          </p:txBody>
+        </p:sp>
+      </p:grpSp>
       <p:pic>
         <p:nvPicPr>
-          <p:cNvPr id="7" name="Graphic 6" descr="Fork and knife">
+          <p:cNvPr id="4" name="Picture 3" descr="A picture containing diagram&#10;&#10;Description automatically generated">
             <a:extLst>
               <a:ext uri="{FF2B5EF4-FFF2-40B4-BE49-F238E27FC236}">
-                <a16:creationId xmlns:a16="http://schemas.microsoft.com/office/drawing/2014/main" id="{B198E7E1-D31B-4CC3-9400-2678C7483001}"/>
+                <a16:creationId xmlns:a16="http://schemas.microsoft.com/office/drawing/2014/main" id="{8C35BE93-AFFF-4774-8006-4E9E7A916E7C}"/>
               </a:ext>
             </a:extLst>
           </p:cNvPr>
@@ -30558,9 +31495,6 @@
               <a:ext uri="{28A0092B-C50C-407E-A947-70E740481C1C}">
                 <a14:useLocalDpi xmlns:a14="http://schemas.microsoft.com/office/drawing/2010/main" val="0"/>
               </a:ext>
-              <a:ext uri="{96DAC541-7B7A-43D3-8B79-37D633B846F1}">
-                <asvg:svgBlip xmlns:asvg="http://schemas.microsoft.com/office/drawing/2016/SVG/main" r:embed="rId3"/>
-              </a:ext>
             </a:extLst>
           </a:blip>
           <a:stretch>
@@ -30569,8 +31503,8 @@
         </p:blipFill>
         <p:spPr>
           <a:xfrm>
-            <a:off x="6606253" y="957860"/>
-            <a:ext cx="4942280" cy="4942280"/>
+            <a:off x="8288720" y="2674698"/>
+            <a:ext cx="3586544" cy="3989765"/>
           </a:xfrm>
           <a:prstGeom prst="rect">
             <a:avLst/>
@@ -30579,10 +31513,10 @@
       </p:pic>
       <p:sp>
         <p:nvSpPr>
-          <p:cNvPr id="5" name="TextBox 4">
+          <p:cNvPr id="27" name="TextBox 26">
             <a:extLst>
               <a:ext uri="{FF2B5EF4-FFF2-40B4-BE49-F238E27FC236}">
-                <a16:creationId xmlns:a16="http://schemas.microsoft.com/office/drawing/2014/main" id="{55F18444-DDB7-4DDB-B52D-DDA1406EC054}"/>
+                <a16:creationId xmlns:a16="http://schemas.microsoft.com/office/drawing/2014/main" id="{028309BC-4BC7-4B27-8C59-ECF148BCFFEF}"/>
               </a:ext>
             </a:extLst>
           </p:cNvPr>
@@ -30591,8 +31525,8 @@
         </p:nvSpPr>
         <p:spPr>
           <a:xfrm>
-            <a:off x="434134" y="3128791"/>
-            <a:ext cx="5094515" cy="954107"/>
+            <a:off x="3767113" y="2951946"/>
+            <a:ext cx="5094515" cy="1384995"/>
           </a:xfrm>
           <a:prstGeom prst="rect">
             <a:avLst/>
@@ -30604,6 +31538,12 @@
             <a:spAutoFit/>
           </a:bodyPr>
           <a:lstStyle/>
+          <a:p>
+            <a:r>
+              <a:rPr lang="en-US" sz="2800" dirty="0"/>
+              <a:t>Options</a:t>
+            </a:r>
+          </a:p>
           <a:p>
             <a:pPr marL="285750" indent="-285750">
               <a:buFont typeface="Arial" panose="020B0604020202020204" pitchFamily="34" charset="0"/>
@@ -30629,7 +31569,7 @@
     </p:spTree>
     <p:extLst>
       <p:ext uri="{BB962C8B-B14F-4D97-AF65-F5344CB8AC3E}">
-        <p14:creationId xmlns:p14="http://schemas.microsoft.com/office/powerpoint/2010/main" val="4276964177"/>
+        <p14:creationId xmlns:p14="http://schemas.microsoft.com/office/powerpoint/2010/main" val="1915850324"/>
       </p:ext>
     </p:extLst>
   </p:cSld>
@@ -30639,7 +31579,7 @@
 </p:sld>
 </file>
 
-<file path=ppt/slides/slide13.xml><?xml version="1.0" encoding="utf-8"?>
+<file path=ppt/slides/slide14.xml><?xml version="1.0" encoding="utf-8"?>
 <p:sld xmlns:a="http://schemas.openxmlformats.org/drawingml/2006/main" xmlns:r="http://schemas.openxmlformats.org/officeDocument/2006/relationships" xmlns:p="http://schemas.openxmlformats.org/presentationml/2006/main">
   <p:cSld>
     <p:spTree>
@@ -30786,7 +31726,7 @@
 </p:sld>
 </file>
 
-<file path=ppt/slides/slide14.xml><?xml version="1.0" encoding="utf-8"?>
+<file path=ppt/slides/slide15.xml><?xml version="1.0" encoding="utf-8"?>
 <p:sld xmlns:a="http://schemas.openxmlformats.org/drawingml/2006/main" xmlns:r="http://schemas.openxmlformats.org/officeDocument/2006/relationships" xmlns:p="http://schemas.openxmlformats.org/presentationml/2006/main">
   <p:cSld>
     <p:spTree>
@@ -30879,7 +31819,7 @@
 </p:sld>
 </file>
 
-<file path=ppt/slides/slide15.xml><?xml version="1.0" encoding="utf-8"?>
+<file path=ppt/slides/slide16.xml><?xml version="1.0" encoding="utf-8"?>
 <p:sld xmlns:a="http://schemas.openxmlformats.org/drawingml/2006/main" xmlns:r="http://schemas.openxmlformats.org/officeDocument/2006/relationships" xmlns:p="http://schemas.openxmlformats.org/presentationml/2006/main">
   <p:cSld>
     <p:bg>
@@ -43723,13 +44663,13 @@
         </p:nvSpPr>
         <p:spPr>
           <a:xfrm>
-            <a:off x="838200" y="2688693"/>
-            <a:ext cx="10515600" cy="3538661"/>
+            <a:off x="838200" y="2778369"/>
+            <a:ext cx="10515600" cy="3800677"/>
           </a:xfrm>
         </p:spPr>
         <p:txBody>
           <a:bodyPr>
-            <a:normAutofit/>
+            <a:normAutofit fontScale="92500" lnSpcReduction="20000"/>
           </a:bodyPr>
           <a:lstStyle/>
           <a:p>
@@ -43765,7 +44705,62 @@
             </a:pPr>
             <a:r>
               <a:rPr lang="en-US" dirty="0"/>
-              <a:t>We implement the special formula using the user’s weight, height, age and gender.</a:t>
+              <a:t>The formula to calculate BMR varies depending on gender</a:t>
+            </a:r>
+          </a:p>
+          <a:p>
+            <a:pPr marL="0" indent="0">
+              <a:lnSpc>
+                <a:spcPct val="90000"/>
+              </a:lnSpc>
+              <a:buFont typeface="Arial" panose="020B0604020202020204" pitchFamily="34" charset="0"/>
+              <a:buNone/>
+            </a:pPr>
+            <a:r>
+              <a:rPr lang="en-US" dirty="0"/>
+              <a:t>Male:      </a:t>
+            </a:r>
+            <a:r>
+              <a:rPr lang="en-US" i="1" dirty="0"/>
+              <a:t>BMR = 66 + (6.23 * weight) + (12.7 * height) - (6.8 * age)</a:t>
+            </a:r>
+          </a:p>
+          <a:p>
+            <a:pPr marL="0" indent="0">
+              <a:lnSpc>
+                <a:spcPct val="90000"/>
+              </a:lnSpc>
+              <a:buFont typeface="Arial" panose="020B0604020202020204" pitchFamily="34" charset="0"/>
+              <a:buNone/>
+            </a:pPr>
+            <a:r>
+              <a:rPr lang="en-US" dirty="0"/>
+              <a:t>Female</a:t>
+            </a:r>
+            <a:r>
+              <a:rPr lang="en-US" i="1" dirty="0"/>
+              <a:t>:  BMR = 665 + (4.35 * weight) + (4.7 * height) - (4.7 * age)</a:t>
+            </a:r>
+          </a:p>
+          <a:p>
+            <a:pPr marL="0" indent="0">
+              <a:lnSpc>
+                <a:spcPct val="90000"/>
+              </a:lnSpc>
+              <a:buNone/>
+            </a:pPr>
+            <a:endParaRPr lang="en-US" sz="2800" dirty="0"/>
+          </a:p>
+          <a:p>
+            <a:pPr marL="0" indent="0">
+              <a:lnSpc>
+                <a:spcPct val="90000"/>
+              </a:lnSpc>
+              <a:buNone/>
+            </a:pPr>
+            <a:r>
+              <a:rPr lang="en-US" dirty="0"/>
+              <a:t>We implement this formula using the user’s weight, height, age and gender.</a:t>
             </a:r>
           </a:p>
           <a:p>
@@ -43810,7 +44805,7 @@
         </p:blipFill>
         <p:spPr>
           <a:xfrm>
-            <a:off x="8227241" y="-101838"/>
+            <a:off x="8227241" y="0"/>
             <a:ext cx="2865480" cy="2865480"/>
           </a:xfrm>
           <a:prstGeom prst="rect">
@@ -43912,7 +44907,7 @@
         </p:spPr>
         <p:txBody>
           <a:bodyPr>
-            <a:normAutofit/>
+            <a:normAutofit lnSpcReduction="10000"/>
           </a:bodyPr>
           <a:lstStyle/>
           <a:p>
@@ -43923,6 +44918,50 @@
               <a:rPr lang="en-US" dirty="0"/>
               <a:t>The BMI is derived from the body mass, or weight, and the height of a person. It determines whether a person is at a healthy weight</a:t>
             </a:r>
+          </a:p>
+          <a:p>
+            <a:pPr marL="0" indent="0">
+              <a:buNone/>
+            </a:pPr>
+            <a:r>
+              <a:rPr lang="en-US" dirty="0"/>
+              <a:t>This is the formula: </a:t>
+            </a:r>
+            <a:r>
+              <a:rPr lang="en-US" i="1" dirty="0"/>
+              <a:t>BMI=</a:t>
+            </a:r>
+            <a:r>
+              <a:rPr lang="en-US" b="0" i="1" dirty="0">
+                <a:effectLst/>
+              </a:rPr>
+              <a:t> weight (</a:t>
+            </a:r>
+            <a:r>
+              <a:rPr lang="en-US" b="0" i="1" dirty="0" err="1">
+                <a:effectLst/>
+              </a:rPr>
+              <a:t>lb</a:t>
+            </a:r>
+            <a:r>
+              <a:rPr lang="en-US" b="0" i="1" dirty="0">
+                <a:effectLst/>
+              </a:rPr>
+              <a:t>) / [height (in)]</a:t>
+            </a:r>
+            <a:r>
+              <a:rPr lang="en-US" b="0" i="1" baseline="30000" dirty="0">
+                <a:effectLst/>
+              </a:rPr>
+              <a:t>2</a:t>
+            </a:r>
+            <a:r>
+              <a:rPr lang="en-US" b="0" i="1" dirty="0">
+                <a:effectLst/>
+              </a:rPr>
+              <a:t> x 703 </a:t>
+            </a:r>
+            <a:endParaRPr lang="en-US" i="1" dirty="0"/>
           </a:p>
           <a:p>
             <a:pPr marL="0" indent="0">

</xml_diff>